<commit_message>
commit webmvc / clear -> commit -> maybe done
</commit_message>
<xml_diff>
--- a/website/tai lieu word, pp/Bao cao TTCS HA MINH DUC CNTTK18E.pptx
+++ b/website/tai lieu word, pp/Bao cao TTCS HA MINH DUC CNTTK18E.pptx
@@ -5,7 +5,7 @@
     <p:sldMasterId id="2147483659" r:id="rId1"/>
   </p:sldMasterIdLst>
   <p:notesMasterIdLst>
-    <p:notesMasterId r:id="rId34"/>
+    <p:notesMasterId r:id="rId35"/>
   </p:notesMasterIdLst>
   <p:sldIdLst>
     <p:sldId id="256" r:id="rId2"/>
@@ -30,31 +30,32 @@
     <p:sldId id="323" r:id="rId21"/>
     <p:sldId id="324" r:id="rId22"/>
     <p:sldId id="322" r:id="rId23"/>
-    <p:sldId id="325" r:id="rId24"/>
-    <p:sldId id="326" r:id="rId25"/>
-    <p:sldId id="327" r:id="rId26"/>
-    <p:sldId id="328" r:id="rId27"/>
-    <p:sldId id="329" r:id="rId28"/>
-    <p:sldId id="330" r:id="rId29"/>
-    <p:sldId id="331" r:id="rId30"/>
-    <p:sldId id="332" r:id="rId31"/>
-    <p:sldId id="333" r:id="rId32"/>
-    <p:sldId id="308" r:id="rId33"/>
+    <p:sldId id="334" r:id="rId24"/>
+    <p:sldId id="325" r:id="rId25"/>
+    <p:sldId id="326" r:id="rId26"/>
+    <p:sldId id="327" r:id="rId27"/>
+    <p:sldId id="328" r:id="rId28"/>
+    <p:sldId id="329" r:id="rId29"/>
+    <p:sldId id="330" r:id="rId30"/>
+    <p:sldId id="331" r:id="rId31"/>
+    <p:sldId id="332" r:id="rId32"/>
+    <p:sldId id="333" r:id="rId33"/>
+    <p:sldId id="308" r:id="rId34"/>
   </p:sldIdLst>
   <p:sldSz cx="9144000" cy="5143500" type="screen16x9"/>
   <p:notesSz cx="6858000" cy="9144000"/>
   <p:embeddedFontLst>
     <p:embeddedFont>
-      <p:font typeface="Oswald" panose="020B0604020202020204" pitchFamily="2" charset="0"/>
-      <p:regular r:id="rId35"/>
-      <p:bold r:id="rId36"/>
+      <p:font typeface="Oswald" panose="00000500000000000000" pitchFamily="2" charset="0"/>
+      <p:regular r:id="rId36"/>
+      <p:bold r:id="rId37"/>
     </p:embeddedFont>
     <p:embeddedFont>
       <p:font typeface="Source Sans Pro" panose="020B0503030403020204" pitchFamily="34" charset="0"/>
-      <p:regular r:id="rId37"/>
-      <p:bold r:id="rId38"/>
-      <p:italic r:id="rId39"/>
-      <p:boldItalic r:id="rId40"/>
+      <p:regular r:id="rId38"/>
+      <p:bold r:id="rId39"/>
+      <p:italic r:id="rId40"/>
+      <p:boldItalic r:id="rId41"/>
     </p:embeddedFont>
   </p:embeddedFontLst>
   <p:defaultTextStyle>
@@ -13897,10 +13898,10 @@
       </p:sp>
       <p:pic>
         <p:nvPicPr>
-          <p:cNvPr id="5" name="Picture 4">
+          <p:cNvPr id="8" name="Picture 7">
             <a:extLst>
               <a:ext uri="{FF2B5EF4-FFF2-40B4-BE49-F238E27FC236}">
-                <a16:creationId xmlns:a16="http://schemas.microsoft.com/office/drawing/2014/main" id="{AAF1531F-ECA4-4564-91EC-9ED15E169D78}"/>
+                <a16:creationId xmlns:a16="http://schemas.microsoft.com/office/drawing/2014/main" id="{7A689CC1-CBF6-476F-BABC-89F1BBF39647}"/>
               </a:ext>
             </a:extLst>
           </p:cNvPr>
@@ -13917,8 +13918,8 @@
         </p:blipFill>
         <p:spPr>
           <a:xfrm>
-            <a:off x="1354843" y="880708"/>
-            <a:ext cx="6434313" cy="3218852"/>
+            <a:off x="1354843" y="857837"/>
+            <a:ext cx="6434313" cy="3404955"/>
           </a:xfrm>
           <a:prstGeom prst="rect">
             <a:avLst/>
@@ -14005,7 +14006,6 @@
             </a:r>
             <a:r>
               <a:rPr lang="en-US" dirty="0">
-                <a:effectLst/>
                 <a:latin typeface="Oswald" panose="020B0604020202020204" pitchFamily="2" charset="0"/>
                 <a:ea typeface="Times New Roman" panose="02020603050405020304" pitchFamily="18" charset="0"/>
                 <a:cs typeface="Times New Roman" panose="02020603050405020304" pitchFamily="18" charset="0"/>
@@ -14014,34 +14014,30 @@
             </a:r>
             <a:r>
               <a:rPr lang="en-US" dirty="0" err="1">
-                <a:effectLst/>
                 <a:latin typeface="Oswald" panose="020B0604020202020204" pitchFamily="2" charset="0"/>
                 <a:ea typeface="Times New Roman" panose="02020603050405020304" pitchFamily="18" charset="0"/>
                 <a:cs typeface="Times New Roman" panose="02020603050405020304" pitchFamily="18" charset="0"/>
               </a:rPr>
-              <a:t>trang</a:t>
+              <a:t>thông</a:t>
             </a:r>
             <a:r>
               <a:rPr lang="en-US" dirty="0">
-                <a:effectLst/>
                 <a:latin typeface="Oswald" panose="020B0604020202020204" pitchFamily="2" charset="0"/>
                 <a:ea typeface="Times New Roman" panose="02020603050405020304" pitchFamily="18" charset="0"/>
                 <a:cs typeface="Times New Roman" panose="02020603050405020304" pitchFamily="18" charset="0"/>
               </a:rPr>
-              <a:t> </a:t>
+              <a:t> tin </a:t>
             </a:r>
             <a:r>
               <a:rPr lang="en-US" dirty="0" err="1">
-                <a:effectLst/>
                 <a:latin typeface="Oswald" panose="020B0604020202020204" pitchFamily="2" charset="0"/>
                 <a:ea typeface="Times New Roman" panose="02020603050405020304" pitchFamily="18" charset="0"/>
                 <a:cs typeface="Times New Roman" panose="02020603050405020304" pitchFamily="18" charset="0"/>
               </a:rPr>
-              <a:t>thanh</a:t>
+              <a:t>khách</a:t>
             </a:r>
             <a:r>
               <a:rPr lang="en-US" dirty="0">
-                <a:effectLst/>
                 <a:latin typeface="Oswald" panose="020B0604020202020204" pitchFamily="2" charset="0"/>
                 <a:ea typeface="Times New Roman" panose="02020603050405020304" pitchFamily="18" charset="0"/>
                 <a:cs typeface="Times New Roman" panose="02020603050405020304" pitchFamily="18" charset="0"/>
@@ -14050,12 +14046,11 @@
             </a:r>
             <a:r>
               <a:rPr lang="en-US" dirty="0" err="1">
-                <a:effectLst/>
                 <a:latin typeface="Oswald" panose="020B0604020202020204" pitchFamily="2" charset="0"/>
                 <a:ea typeface="Times New Roman" panose="02020603050405020304" pitchFamily="18" charset="0"/>
                 <a:cs typeface="Times New Roman" panose="02020603050405020304" pitchFamily="18" charset="0"/>
               </a:rPr>
-              <a:t>toán</a:t>
+              <a:t>hàng</a:t>
             </a:r>
             <a:endParaRPr lang="en-US" dirty="0">
               <a:latin typeface="Oswald" panose="020B0604020202020204" pitchFamily="2" charset="0"/>
@@ -14106,7 +14101,7 @@
           <p:cNvPr id="5" name="Picture 4">
             <a:extLst>
               <a:ext uri="{FF2B5EF4-FFF2-40B4-BE49-F238E27FC236}">
-                <a16:creationId xmlns:a16="http://schemas.microsoft.com/office/drawing/2014/main" id="{AAF1531F-ECA4-4564-91EC-9ED15E169D78}"/>
+                <a16:creationId xmlns:a16="http://schemas.microsoft.com/office/drawing/2014/main" id="{7719B4F4-E131-4475-9F92-AF2A42A6A19E}"/>
               </a:ext>
             </a:extLst>
           </p:cNvPr>
@@ -14123,8 +14118,8 @@
         </p:blipFill>
         <p:spPr>
           <a:xfrm>
-            <a:off x="1354843" y="880708"/>
-            <a:ext cx="6434313" cy="3218852"/>
+            <a:off x="1132278" y="857837"/>
+            <a:ext cx="6656878" cy="3342910"/>
           </a:xfrm>
           <a:prstGeom prst="rect">
             <a:avLst/>
@@ -14134,7 +14129,7 @@
     </p:spTree>
     <p:extLst>
       <p:ext uri="{BB962C8B-B14F-4D97-AF65-F5344CB8AC3E}">
-        <p14:creationId xmlns:p14="http://schemas.microsoft.com/office/powerpoint/2010/main" val="623029609"/>
+        <p14:creationId xmlns:p14="http://schemas.microsoft.com/office/powerpoint/2010/main" val="1644910429"/>
       </p:ext>
     </p:extLst>
   </p:cSld>
@@ -14225,7 +14220,7 @@
                 <a:ea typeface="Times New Roman" panose="02020603050405020304" pitchFamily="18" charset="0"/>
                 <a:cs typeface="Times New Roman" panose="02020603050405020304" pitchFamily="18" charset="0"/>
               </a:rPr>
-              <a:t>đăng</a:t>
+              <a:t>trang</a:t>
             </a:r>
             <a:r>
               <a:rPr lang="en-US" dirty="0">
@@ -14243,7 +14238,7 @@
                 <a:ea typeface="Times New Roman" panose="02020603050405020304" pitchFamily="18" charset="0"/>
                 <a:cs typeface="Times New Roman" panose="02020603050405020304" pitchFamily="18" charset="0"/>
               </a:rPr>
-              <a:t>nhập</a:t>
+              <a:t>thanh</a:t>
             </a:r>
             <a:r>
               <a:rPr lang="en-US" dirty="0">
@@ -14261,43 +14256,7 @@
                 <a:ea typeface="Times New Roman" panose="02020603050405020304" pitchFamily="18" charset="0"/>
                 <a:cs typeface="Times New Roman" panose="02020603050405020304" pitchFamily="18" charset="0"/>
               </a:rPr>
-              <a:t>trang</a:t>
-            </a:r>
-            <a:r>
-              <a:rPr lang="en-US" dirty="0">
-                <a:effectLst/>
-                <a:latin typeface="Oswald" panose="020B0604020202020204" pitchFamily="2" charset="0"/>
-                <a:ea typeface="Times New Roman" panose="02020603050405020304" pitchFamily="18" charset="0"/>
-                <a:cs typeface="Times New Roman" panose="02020603050405020304" pitchFamily="18" charset="0"/>
-              </a:rPr>
-              <a:t> </a:t>
-            </a:r>
-            <a:r>
-              <a:rPr lang="en-US" dirty="0" err="1">
-                <a:effectLst/>
-                <a:latin typeface="Oswald" panose="020B0604020202020204" pitchFamily="2" charset="0"/>
-                <a:ea typeface="Times New Roman" panose="02020603050405020304" pitchFamily="18" charset="0"/>
-                <a:cs typeface="Times New Roman" panose="02020603050405020304" pitchFamily="18" charset="0"/>
-              </a:rPr>
-              <a:t>quản</a:t>
-            </a:r>
-            <a:r>
-              <a:rPr lang="en-US" dirty="0">
-                <a:effectLst/>
-                <a:latin typeface="Oswald" panose="020B0604020202020204" pitchFamily="2" charset="0"/>
-                <a:ea typeface="Times New Roman" panose="02020603050405020304" pitchFamily="18" charset="0"/>
-                <a:cs typeface="Times New Roman" panose="02020603050405020304" pitchFamily="18" charset="0"/>
-              </a:rPr>
-              <a:t> </a:t>
-            </a:r>
-            <a:r>
-              <a:rPr lang="en-US" dirty="0" err="1">
-                <a:effectLst/>
-                <a:latin typeface="Oswald" panose="020B0604020202020204" pitchFamily="2" charset="0"/>
-                <a:ea typeface="Times New Roman" panose="02020603050405020304" pitchFamily="18" charset="0"/>
-                <a:cs typeface="Times New Roman" panose="02020603050405020304" pitchFamily="18" charset="0"/>
-              </a:rPr>
-              <a:t>trị</a:t>
+              <a:t>toán</a:t>
             </a:r>
             <a:endParaRPr lang="en-US" dirty="0">
               <a:latin typeface="Oswald" panose="020B0604020202020204" pitchFamily="2" charset="0"/>
@@ -14345,10 +14304,10 @@
       </p:sp>
       <p:pic>
         <p:nvPicPr>
-          <p:cNvPr id="6" name="Picture 5">
+          <p:cNvPr id="5" name="Picture 4">
             <a:extLst>
               <a:ext uri="{FF2B5EF4-FFF2-40B4-BE49-F238E27FC236}">
-                <a16:creationId xmlns:a16="http://schemas.microsoft.com/office/drawing/2014/main" id="{8D3731AE-4317-419D-919A-CC41CFAEEFCA}"/>
+                <a16:creationId xmlns:a16="http://schemas.microsoft.com/office/drawing/2014/main" id="{AAF1531F-ECA4-4564-91EC-9ED15E169D78}"/>
               </a:ext>
             </a:extLst>
           </p:cNvPr>
@@ -14365,8 +14324,8 @@
         </p:blipFill>
         <p:spPr>
           <a:xfrm>
-            <a:off x="1723921" y="831850"/>
-            <a:ext cx="5696158" cy="3318974"/>
+            <a:off x="1354843" y="880708"/>
+            <a:ext cx="6434313" cy="3218852"/>
           </a:xfrm>
           <a:prstGeom prst="rect">
             <a:avLst/>
@@ -14376,7 +14335,7 @@
     </p:spTree>
     <p:extLst>
       <p:ext uri="{BB962C8B-B14F-4D97-AF65-F5344CB8AC3E}">
-        <p14:creationId xmlns:p14="http://schemas.microsoft.com/office/powerpoint/2010/main" val="1852758223"/>
+        <p14:creationId xmlns:p14="http://schemas.microsoft.com/office/powerpoint/2010/main" val="623029609"/>
       </p:ext>
     </p:extLst>
   </p:cSld>
@@ -14453,6 +14412,7 @@
             </a:r>
             <a:r>
               <a:rPr lang="en-US" dirty="0">
+                <a:effectLst/>
                 <a:latin typeface="Oswald" panose="020B0604020202020204" pitchFamily="2" charset="0"/>
                 <a:ea typeface="Times New Roman" panose="02020603050405020304" pitchFamily="18" charset="0"/>
                 <a:cs typeface="Times New Roman" panose="02020603050405020304" pitchFamily="18" charset="0"/>
@@ -14466,7 +14426,7 @@
                 <a:ea typeface="Times New Roman" panose="02020603050405020304" pitchFamily="18" charset="0"/>
                 <a:cs typeface="Times New Roman" panose="02020603050405020304" pitchFamily="18" charset="0"/>
               </a:rPr>
-              <a:t>trang</a:t>
+              <a:t>đăng</a:t>
             </a:r>
             <a:r>
               <a:rPr lang="en-US" dirty="0">
@@ -14484,7 +14444,7 @@
                 <a:ea typeface="Times New Roman" panose="02020603050405020304" pitchFamily="18" charset="0"/>
                 <a:cs typeface="Times New Roman" panose="02020603050405020304" pitchFamily="18" charset="0"/>
               </a:rPr>
-              <a:t>quản</a:t>
+              <a:t>nhập</a:t>
             </a:r>
             <a:r>
               <a:rPr lang="en-US" dirty="0">
@@ -14502,7 +14462,7 @@
                 <a:ea typeface="Times New Roman" panose="02020603050405020304" pitchFamily="18" charset="0"/>
                 <a:cs typeface="Times New Roman" panose="02020603050405020304" pitchFamily="18" charset="0"/>
               </a:rPr>
-              <a:t>lý</a:t>
+              <a:t>trang</a:t>
             </a:r>
             <a:r>
               <a:rPr lang="en-US" dirty="0">
@@ -14520,7 +14480,7 @@
                 <a:ea typeface="Times New Roman" panose="02020603050405020304" pitchFamily="18" charset="0"/>
                 <a:cs typeface="Times New Roman" panose="02020603050405020304" pitchFamily="18" charset="0"/>
               </a:rPr>
-              <a:t>sản</a:t>
+              <a:t>quản</a:t>
             </a:r>
             <a:r>
               <a:rPr lang="en-US" dirty="0">
@@ -14538,7 +14498,7 @@
                 <a:ea typeface="Times New Roman" panose="02020603050405020304" pitchFamily="18" charset="0"/>
                 <a:cs typeface="Times New Roman" panose="02020603050405020304" pitchFamily="18" charset="0"/>
               </a:rPr>
-              <a:t>phẩm</a:t>
+              <a:t>trị</a:t>
             </a:r>
             <a:endParaRPr lang="en-US" dirty="0">
               <a:latin typeface="Oswald" panose="020B0604020202020204" pitchFamily="2" charset="0"/>
@@ -14586,10 +14546,10 @@
       </p:sp>
       <p:pic>
         <p:nvPicPr>
-          <p:cNvPr id="5" name="Picture 4">
+          <p:cNvPr id="6" name="Picture 5">
             <a:extLst>
               <a:ext uri="{FF2B5EF4-FFF2-40B4-BE49-F238E27FC236}">
-                <a16:creationId xmlns:a16="http://schemas.microsoft.com/office/drawing/2014/main" id="{89368BEF-E09E-40D9-A57A-0C871BD71328}"/>
+                <a16:creationId xmlns:a16="http://schemas.microsoft.com/office/drawing/2014/main" id="{8D3731AE-4317-419D-919A-CC41CFAEEFCA}"/>
               </a:ext>
             </a:extLst>
           </p:cNvPr>
@@ -14606,8 +14566,8 @@
         </p:blipFill>
         <p:spPr>
           <a:xfrm>
-            <a:off x="1138780" y="777832"/>
-            <a:ext cx="6866440" cy="3615376"/>
+            <a:off x="1723921" y="831850"/>
+            <a:ext cx="5696158" cy="3318974"/>
           </a:xfrm>
           <a:prstGeom prst="rect">
             <a:avLst/>
@@ -14617,7 +14577,7 @@
     </p:spTree>
     <p:extLst>
       <p:ext uri="{BB962C8B-B14F-4D97-AF65-F5344CB8AC3E}">
-        <p14:creationId xmlns:p14="http://schemas.microsoft.com/office/powerpoint/2010/main" val="2847813091"/>
+        <p14:creationId xmlns:p14="http://schemas.microsoft.com/office/powerpoint/2010/main" val="1852758223"/>
       </p:ext>
     </p:extLst>
   </p:cSld>
@@ -14725,10 +14685,29 @@
                 <a:ea typeface="Times New Roman" panose="02020603050405020304" pitchFamily="18" charset="0"/>
                 <a:cs typeface="Times New Roman" panose="02020603050405020304" pitchFamily="18" charset="0"/>
               </a:rPr>
-              <a:t>thêm</a:t>
+              <a:t>quản</a:t>
             </a:r>
             <a:r>
               <a:rPr lang="en-US" dirty="0">
+                <a:effectLst/>
+                <a:latin typeface="Oswald" panose="020B0604020202020204" pitchFamily="2" charset="0"/>
+                <a:ea typeface="Times New Roman" panose="02020603050405020304" pitchFamily="18" charset="0"/>
+                <a:cs typeface="Times New Roman" panose="02020603050405020304" pitchFamily="18" charset="0"/>
+              </a:rPr>
+              <a:t> </a:t>
+            </a:r>
+            <a:r>
+              <a:rPr lang="en-US" dirty="0" err="1">
+                <a:effectLst/>
+                <a:latin typeface="Oswald" panose="020B0604020202020204" pitchFamily="2" charset="0"/>
+                <a:ea typeface="Times New Roman" panose="02020603050405020304" pitchFamily="18" charset="0"/>
+                <a:cs typeface="Times New Roman" panose="02020603050405020304" pitchFamily="18" charset="0"/>
+              </a:rPr>
+              <a:t>lý</a:t>
+            </a:r>
+            <a:r>
+              <a:rPr lang="en-US" dirty="0">
+                <a:effectLst/>
                 <a:latin typeface="Oswald" panose="020B0604020202020204" pitchFamily="2" charset="0"/>
                 <a:ea typeface="Times New Roman" panose="02020603050405020304" pitchFamily="18" charset="0"/>
                 <a:cs typeface="Times New Roman" panose="02020603050405020304" pitchFamily="18" charset="0"/>
@@ -14808,10 +14787,10 @@
       </p:sp>
       <p:pic>
         <p:nvPicPr>
-          <p:cNvPr id="6" name="Picture 5">
+          <p:cNvPr id="5" name="Picture 4">
             <a:extLst>
               <a:ext uri="{FF2B5EF4-FFF2-40B4-BE49-F238E27FC236}">
-                <a16:creationId xmlns:a16="http://schemas.microsoft.com/office/drawing/2014/main" id="{969FC58D-E800-4471-A84A-F8ACFC06F7B6}"/>
+                <a16:creationId xmlns:a16="http://schemas.microsoft.com/office/drawing/2014/main" id="{89368BEF-E09E-40D9-A57A-0C871BD71328}"/>
               </a:ext>
             </a:extLst>
           </p:cNvPr>
@@ -14828,8 +14807,8 @@
         </p:blipFill>
         <p:spPr>
           <a:xfrm>
-            <a:off x="1134149" y="750293"/>
-            <a:ext cx="6875703" cy="3642916"/>
+            <a:off x="1138780" y="777832"/>
+            <a:ext cx="6866440" cy="3615376"/>
           </a:xfrm>
           <a:prstGeom prst="rect">
             <a:avLst/>
@@ -14839,7 +14818,7 @@
     </p:spTree>
     <p:extLst>
       <p:ext uri="{BB962C8B-B14F-4D97-AF65-F5344CB8AC3E}">
-        <p14:creationId xmlns:p14="http://schemas.microsoft.com/office/powerpoint/2010/main" val="1388082330"/>
+        <p14:creationId xmlns:p14="http://schemas.microsoft.com/office/powerpoint/2010/main" val="2847813091"/>
       </p:ext>
     </p:extLst>
   </p:cSld>
@@ -14947,29 +14926,10 @@
                 <a:ea typeface="Times New Roman" panose="02020603050405020304" pitchFamily="18" charset="0"/>
                 <a:cs typeface="Times New Roman" panose="02020603050405020304" pitchFamily="18" charset="0"/>
               </a:rPr>
-              <a:t>chỉnh</a:t>
+              <a:t>thêm</a:t>
             </a:r>
             <a:r>
               <a:rPr lang="en-US" dirty="0">
-                <a:effectLst/>
-                <a:latin typeface="Oswald" panose="020B0604020202020204" pitchFamily="2" charset="0"/>
-                <a:ea typeface="Times New Roman" panose="02020603050405020304" pitchFamily="18" charset="0"/>
-                <a:cs typeface="Times New Roman" panose="02020603050405020304" pitchFamily="18" charset="0"/>
-              </a:rPr>
-              <a:t> </a:t>
-            </a:r>
-            <a:r>
-              <a:rPr lang="en-US" dirty="0" err="1">
-                <a:effectLst/>
-                <a:latin typeface="Oswald" panose="020B0604020202020204" pitchFamily="2" charset="0"/>
-                <a:ea typeface="Times New Roman" panose="02020603050405020304" pitchFamily="18" charset="0"/>
-                <a:cs typeface="Times New Roman" panose="02020603050405020304" pitchFamily="18" charset="0"/>
-              </a:rPr>
-              <a:t>sửa</a:t>
-            </a:r>
-            <a:r>
-              <a:rPr lang="en-US" dirty="0">
-                <a:effectLst/>
                 <a:latin typeface="Oswald" panose="020B0604020202020204" pitchFamily="2" charset="0"/>
                 <a:ea typeface="Times New Roman" panose="02020603050405020304" pitchFamily="18" charset="0"/>
                 <a:cs typeface="Times New Roman" panose="02020603050405020304" pitchFamily="18" charset="0"/>
@@ -15042,6 +15002,247 @@
             <a:fld id="{00000000-1234-1234-1234-123412341234}" type="slidenum">
               <a:rPr lang="en" smtClean="0"/>
               <a:t>27</a:t>
+            </a:fld>
+            <a:endParaRPr lang="en"/>
+          </a:p>
+        </p:txBody>
+      </p:sp>
+      <p:pic>
+        <p:nvPicPr>
+          <p:cNvPr id="6" name="Picture 5">
+            <a:extLst>
+              <a:ext uri="{FF2B5EF4-FFF2-40B4-BE49-F238E27FC236}">
+                <a16:creationId xmlns:a16="http://schemas.microsoft.com/office/drawing/2014/main" id="{969FC58D-E800-4471-A84A-F8ACFC06F7B6}"/>
+              </a:ext>
+            </a:extLst>
+          </p:cNvPr>
+          <p:cNvPicPr>
+            <a:picLocks noChangeAspect="1"/>
+          </p:cNvPicPr>
+          <p:nvPr/>
+        </p:nvPicPr>
+        <p:blipFill>
+          <a:blip r:embed="rId2"/>
+          <a:stretch>
+            <a:fillRect/>
+          </a:stretch>
+        </p:blipFill>
+        <p:spPr>
+          <a:xfrm>
+            <a:off x="1134149" y="750293"/>
+            <a:ext cx="6875703" cy="3642916"/>
+          </a:xfrm>
+          <a:prstGeom prst="rect">
+            <a:avLst/>
+          </a:prstGeom>
+        </p:spPr>
+      </p:pic>
+    </p:spTree>
+    <p:extLst>
+      <p:ext uri="{BB962C8B-B14F-4D97-AF65-F5344CB8AC3E}">
+        <p14:creationId xmlns:p14="http://schemas.microsoft.com/office/powerpoint/2010/main" val="1388082330"/>
+      </p:ext>
+    </p:extLst>
+  </p:cSld>
+  <p:clrMapOvr>
+    <a:masterClrMapping/>
+  </p:clrMapOvr>
+</p:sld>
+</file>
+
+<file path=ppt/slides/slide28.xml><?xml version="1.0" encoding="utf-8"?>
+<p:sld xmlns:a="http://schemas.openxmlformats.org/drawingml/2006/main" xmlns:r="http://schemas.openxmlformats.org/officeDocument/2006/relationships" xmlns:p="http://schemas.openxmlformats.org/presentationml/2006/main">
+  <p:cSld>
+    <p:spTree>
+      <p:nvGrpSpPr>
+        <p:cNvPr id="1" name=""/>
+        <p:cNvGrpSpPr/>
+        <p:nvPr/>
+      </p:nvGrpSpPr>
+      <p:grpSpPr>
+        <a:xfrm>
+          <a:off x="0" y="0"/>
+          <a:ext cx="0" cy="0"/>
+          <a:chOff x="0" y="0"/>
+          <a:chExt cx="0" cy="0"/>
+        </a:xfrm>
+      </p:grpSpPr>
+      <p:sp>
+        <p:nvSpPr>
+          <p:cNvPr id="2" name="Title 1">
+            <a:extLst>
+              <a:ext uri="{FF2B5EF4-FFF2-40B4-BE49-F238E27FC236}">
+                <a16:creationId xmlns:a16="http://schemas.microsoft.com/office/drawing/2014/main" id="{7429139A-A0ED-4341-B6D5-98F50ACFA9B8}"/>
+              </a:ext>
+            </a:extLst>
+          </p:cNvPr>
+          <p:cNvSpPr>
+            <a:spLocks noGrp="1"/>
+          </p:cNvSpPr>
+          <p:nvPr>
+            <p:ph type="title"/>
+          </p:nvPr>
+        </p:nvSpPr>
+        <p:spPr>
+          <a:xfrm>
+            <a:off x="638640" y="259672"/>
+            <a:ext cx="4520100" cy="518160"/>
+          </a:xfrm>
+        </p:spPr>
+        <p:txBody>
+          <a:bodyPr/>
+          <a:lstStyle/>
+          <a:p>
+            <a:pPr marL="342900" indent="-342900" algn="l">
+              <a:buFont typeface="Wingdings" panose="05000000000000000000" pitchFamily="2" charset="2"/>
+              <a:buChar char="q"/>
+            </a:pPr>
+            <a:r>
+              <a:rPr lang="en-US" dirty="0">
+                <a:effectLst/>
+                <a:latin typeface="Oswald" panose="020B0604020202020204" pitchFamily="2" charset="0"/>
+                <a:ea typeface="Times New Roman" panose="02020603050405020304" pitchFamily="18" charset="0"/>
+                <a:cs typeface="Times New Roman" panose="02020603050405020304" pitchFamily="18" charset="0"/>
+              </a:rPr>
+              <a:t>Giao </a:t>
+            </a:r>
+            <a:r>
+              <a:rPr lang="en-US" dirty="0" err="1">
+                <a:effectLst/>
+                <a:latin typeface="Oswald" panose="020B0604020202020204" pitchFamily="2" charset="0"/>
+                <a:ea typeface="Times New Roman" panose="02020603050405020304" pitchFamily="18" charset="0"/>
+                <a:cs typeface="Times New Roman" panose="02020603050405020304" pitchFamily="18" charset="0"/>
+              </a:rPr>
+              <a:t>diện</a:t>
+            </a:r>
+            <a:r>
+              <a:rPr lang="en-US" dirty="0">
+                <a:latin typeface="Oswald" panose="020B0604020202020204" pitchFamily="2" charset="0"/>
+                <a:ea typeface="Times New Roman" panose="02020603050405020304" pitchFamily="18" charset="0"/>
+                <a:cs typeface="Times New Roman" panose="02020603050405020304" pitchFamily="18" charset="0"/>
+              </a:rPr>
+              <a:t> </a:t>
+            </a:r>
+            <a:r>
+              <a:rPr lang="en-US" dirty="0" err="1">
+                <a:effectLst/>
+                <a:latin typeface="Oswald" panose="020B0604020202020204" pitchFamily="2" charset="0"/>
+                <a:ea typeface="Times New Roman" panose="02020603050405020304" pitchFamily="18" charset="0"/>
+                <a:cs typeface="Times New Roman" panose="02020603050405020304" pitchFamily="18" charset="0"/>
+              </a:rPr>
+              <a:t>trang</a:t>
+            </a:r>
+            <a:r>
+              <a:rPr lang="en-US" dirty="0">
+                <a:effectLst/>
+                <a:latin typeface="Oswald" panose="020B0604020202020204" pitchFamily="2" charset="0"/>
+                <a:ea typeface="Times New Roman" panose="02020603050405020304" pitchFamily="18" charset="0"/>
+                <a:cs typeface="Times New Roman" panose="02020603050405020304" pitchFamily="18" charset="0"/>
+              </a:rPr>
+              <a:t> </a:t>
+            </a:r>
+            <a:r>
+              <a:rPr lang="en-US" dirty="0" err="1">
+                <a:effectLst/>
+                <a:latin typeface="Oswald" panose="020B0604020202020204" pitchFamily="2" charset="0"/>
+                <a:ea typeface="Times New Roman" panose="02020603050405020304" pitchFamily="18" charset="0"/>
+                <a:cs typeface="Times New Roman" panose="02020603050405020304" pitchFamily="18" charset="0"/>
+              </a:rPr>
+              <a:t>chỉnh</a:t>
+            </a:r>
+            <a:r>
+              <a:rPr lang="en-US" dirty="0">
+                <a:effectLst/>
+                <a:latin typeface="Oswald" panose="020B0604020202020204" pitchFamily="2" charset="0"/>
+                <a:ea typeface="Times New Roman" panose="02020603050405020304" pitchFamily="18" charset="0"/>
+                <a:cs typeface="Times New Roman" panose="02020603050405020304" pitchFamily="18" charset="0"/>
+              </a:rPr>
+              <a:t> </a:t>
+            </a:r>
+            <a:r>
+              <a:rPr lang="en-US" dirty="0" err="1">
+                <a:effectLst/>
+                <a:latin typeface="Oswald" panose="020B0604020202020204" pitchFamily="2" charset="0"/>
+                <a:ea typeface="Times New Roman" panose="02020603050405020304" pitchFamily="18" charset="0"/>
+                <a:cs typeface="Times New Roman" panose="02020603050405020304" pitchFamily="18" charset="0"/>
+              </a:rPr>
+              <a:t>sửa</a:t>
+            </a:r>
+            <a:r>
+              <a:rPr lang="en-US" dirty="0">
+                <a:effectLst/>
+                <a:latin typeface="Oswald" panose="020B0604020202020204" pitchFamily="2" charset="0"/>
+                <a:ea typeface="Times New Roman" panose="02020603050405020304" pitchFamily="18" charset="0"/>
+                <a:cs typeface="Times New Roman" panose="02020603050405020304" pitchFamily="18" charset="0"/>
+              </a:rPr>
+              <a:t> </a:t>
+            </a:r>
+            <a:r>
+              <a:rPr lang="en-US" dirty="0" err="1">
+                <a:effectLst/>
+                <a:latin typeface="Oswald" panose="020B0604020202020204" pitchFamily="2" charset="0"/>
+                <a:ea typeface="Times New Roman" panose="02020603050405020304" pitchFamily="18" charset="0"/>
+                <a:cs typeface="Times New Roman" panose="02020603050405020304" pitchFamily="18" charset="0"/>
+              </a:rPr>
+              <a:t>sản</a:t>
+            </a:r>
+            <a:r>
+              <a:rPr lang="en-US" dirty="0">
+                <a:effectLst/>
+                <a:latin typeface="Oswald" panose="020B0604020202020204" pitchFamily="2" charset="0"/>
+                <a:ea typeface="Times New Roman" panose="02020603050405020304" pitchFamily="18" charset="0"/>
+                <a:cs typeface="Times New Roman" panose="02020603050405020304" pitchFamily="18" charset="0"/>
+              </a:rPr>
+              <a:t> </a:t>
+            </a:r>
+            <a:r>
+              <a:rPr lang="en-US" dirty="0" err="1">
+                <a:effectLst/>
+                <a:latin typeface="Oswald" panose="020B0604020202020204" pitchFamily="2" charset="0"/>
+                <a:ea typeface="Times New Roman" panose="02020603050405020304" pitchFamily="18" charset="0"/>
+                <a:cs typeface="Times New Roman" panose="02020603050405020304" pitchFamily="18" charset="0"/>
+              </a:rPr>
+              <a:t>phẩm</a:t>
+            </a:r>
+            <a:endParaRPr lang="en-US" dirty="0">
+              <a:latin typeface="Oswald" panose="020B0604020202020204" pitchFamily="2" charset="0"/>
+            </a:endParaRPr>
+          </a:p>
+        </p:txBody>
+      </p:sp>
+      <p:sp>
+        <p:nvSpPr>
+          <p:cNvPr id="4" name="Slide Number Placeholder 3">
+            <a:extLst>
+              <a:ext uri="{FF2B5EF4-FFF2-40B4-BE49-F238E27FC236}">
+                <a16:creationId xmlns:a16="http://schemas.microsoft.com/office/drawing/2014/main" id="{F3500BF5-97F9-4622-B4E7-28EF562E4BBC}"/>
+              </a:ext>
+            </a:extLst>
+          </p:cNvPr>
+          <p:cNvSpPr>
+            <a:spLocks noGrp="1"/>
+          </p:cNvSpPr>
+          <p:nvPr>
+            <p:ph type="sldNum" idx="12"/>
+          </p:nvPr>
+        </p:nvSpPr>
+        <p:spPr/>
+        <p:txBody>
+          <a:bodyPr/>
+          <a:lstStyle/>
+          <a:p>
+            <a:pPr marL="0" lvl="0" indent="0" algn="r" rtl="0">
+              <a:spcBef>
+                <a:spcPts val="0"/>
+              </a:spcBef>
+              <a:spcAft>
+                <a:spcPts val="0"/>
+              </a:spcAft>
+              <a:buNone/>
+            </a:pPr>
+            <a:fld id="{00000000-1234-1234-1234-123412341234}" type="slidenum">
+              <a:rPr lang="en" smtClean="0"/>
+              <a:t>28</a:t>
             </a:fld>
             <a:endParaRPr lang="en"/>
           </a:p>
@@ -15090,7 +15291,7 @@
 </p:sld>
 </file>
 
-<file path=ppt/slides/slide28.xml><?xml version="1.0" encoding="utf-8"?>
+<file path=ppt/slides/slide29.xml><?xml version="1.0" encoding="utf-8"?>
 <p:sld xmlns:a="http://schemas.openxmlformats.org/drawingml/2006/main" xmlns:r="http://schemas.openxmlformats.org/officeDocument/2006/relationships" xmlns:p="http://schemas.openxmlformats.org/presentationml/2006/main">
   <p:cSld>
     <p:spTree>
@@ -15265,7 +15466,7 @@
             </a:pPr>
             <a:fld id="{00000000-1234-1234-1234-123412341234}" type="slidenum">
               <a:rPr lang="en"/>
-              <a:t>28</a:t>
+              <a:t>29</a:t>
             </a:fld>
             <a:endParaRPr/>
           </a:p>
@@ -15275,356 +15476,6 @@
     <p:extLst>
       <p:ext uri="{BB962C8B-B14F-4D97-AF65-F5344CB8AC3E}">
         <p14:creationId xmlns:p14="http://schemas.microsoft.com/office/powerpoint/2010/main" val="889466544"/>
-      </p:ext>
-    </p:extLst>
-  </p:cSld>
-  <p:clrMapOvr>
-    <a:masterClrMapping/>
-  </p:clrMapOvr>
-</p:sld>
-</file>
-
-<file path=ppt/slides/slide29.xml><?xml version="1.0" encoding="utf-8"?>
-<p:sld xmlns:a="http://schemas.openxmlformats.org/drawingml/2006/main" xmlns:r="http://schemas.openxmlformats.org/officeDocument/2006/relationships" xmlns:p="http://schemas.openxmlformats.org/presentationml/2006/main">
-  <p:cSld>
-    <p:spTree>
-      <p:nvGrpSpPr>
-        <p:cNvPr id="1" name=""/>
-        <p:cNvGrpSpPr/>
-        <p:nvPr/>
-      </p:nvGrpSpPr>
-      <p:grpSpPr>
-        <a:xfrm>
-          <a:off x="0" y="0"/>
-          <a:ext cx="0" cy="0"/>
-          <a:chOff x="0" y="0"/>
-          <a:chExt cx="0" cy="0"/>
-        </a:xfrm>
-      </p:grpSpPr>
-      <p:sp>
-        <p:nvSpPr>
-          <p:cNvPr id="2" name="Title 1">
-            <a:extLst>
-              <a:ext uri="{FF2B5EF4-FFF2-40B4-BE49-F238E27FC236}">
-                <a16:creationId xmlns:a16="http://schemas.microsoft.com/office/drawing/2014/main" id="{70103FA4-43AE-4E9F-8165-B24D7C44ABE8}"/>
-              </a:ext>
-            </a:extLst>
-          </p:cNvPr>
-          <p:cNvSpPr>
-            <a:spLocks noGrp="1"/>
-          </p:cNvSpPr>
-          <p:nvPr>
-            <p:ph type="title"/>
-          </p:nvPr>
-        </p:nvSpPr>
-        <p:spPr>
-          <a:xfrm>
-            <a:off x="237869" y="154065"/>
-            <a:ext cx="7832431" cy="715800"/>
-          </a:xfrm>
-        </p:spPr>
-        <p:txBody>
-          <a:bodyPr/>
-          <a:lstStyle/>
-          <a:p>
-            <a:pPr marL="342900" indent="-342900" algn="l">
-              <a:buFont typeface="Wingdings" panose="05000000000000000000" pitchFamily="2" charset="2"/>
-              <a:buChar char="q"/>
-            </a:pPr>
-            <a:r>
-              <a:rPr lang="en-US" sz="2500" dirty="0" err="1"/>
-              <a:t>Kết</a:t>
-            </a:r>
-            <a:r>
-              <a:rPr lang="en-US" sz="2500" dirty="0"/>
-              <a:t> </a:t>
-            </a:r>
-            <a:r>
-              <a:rPr lang="en-US" sz="2500" dirty="0" err="1"/>
-              <a:t>quả</a:t>
-            </a:r>
-            <a:r>
-              <a:rPr lang="en-US" sz="2500" dirty="0"/>
-              <a:t> </a:t>
-            </a:r>
-            <a:r>
-              <a:rPr lang="en-US" sz="2500" dirty="0" err="1"/>
-              <a:t>đạt</a:t>
-            </a:r>
-            <a:r>
-              <a:rPr lang="en-US" sz="2500" dirty="0"/>
-              <a:t> </a:t>
-            </a:r>
-            <a:r>
-              <a:rPr lang="en-US" sz="2500" dirty="0" err="1"/>
-              <a:t>được</a:t>
-            </a:r>
-            <a:endParaRPr lang="en-US" sz="2500" dirty="0"/>
-          </a:p>
-        </p:txBody>
-      </p:sp>
-      <p:sp>
-        <p:nvSpPr>
-          <p:cNvPr id="3" name="Text Placeholder 2">
-            <a:extLst>
-              <a:ext uri="{FF2B5EF4-FFF2-40B4-BE49-F238E27FC236}">
-                <a16:creationId xmlns:a16="http://schemas.microsoft.com/office/drawing/2014/main" id="{4B2391DA-702F-4EBD-BDDF-1F7F54CCD215}"/>
-              </a:ext>
-            </a:extLst>
-          </p:cNvPr>
-          <p:cNvSpPr>
-            <a:spLocks noGrp="1"/>
-          </p:cNvSpPr>
-          <p:nvPr>
-            <p:ph type="body" idx="1"/>
-          </p:nvPr>
-        </p:nvSpPr>
-        <p:spPr>
-          <a:xfrm>
-            <a:off x="602974" y="811530"/>
-            <a:ext cx="8070574" cy="3520439"/>
-          </a:xfrm>
-        </p:spPr>
-        <p:txBody>
-          <a:bodyPr/>
-          <a:lstStyle/>
-          <a:p>
-            <a:pPr>
-              <a:buSzPct val="100000"/>
-              <a:buFont typeface="Wingdings" panose="05000000000000000000" pitchFamily="2" charset="2"/>
-              <a:buChar char="ü"/>
-            </a:pPr>
-            <a:r>
-              <a:rPr lang="vi-VN" sz="1400" dirty="0">
-                <a:latin typeface="Source Sans Pro" panose="020B0503030403020204" pitchFamily="34" charset="0"/>
-                <a:ea typeface="Source Sans Pro" panose="020B0503030403020204" pitchFamily="34" charset="0"/>
-              </a:rPr>
-              <a:t>Đã đạt được mục tiêu đề ra, hoàn thành website giới thiệu công ty và sản phẩm</a:t>
-            </a:r>
-            <a:r>
-              <a:rPr lang="en-US" sz="1400" dirty="0">
-                <a:latin typeface="Source Sans Pro" panose="020B0503030403020204" pitchFamily="34" charset="0"/>
-                <a:ea typeface="Source Sans Pro" panose="020B0503030403020204" pitchFamily="34" charset="0"/>
-              </a:rPr>
-              <a:t> </a:t>
-            </a:r>
-            <a:r>
-              <a:rPr lang="vi-VN" sz="1400" dirty="0">
-                <a:latin typeface="Source Sans Pro" panose="020B0503030403020204" pitchFamily="34" charset="0"/>
-                <a:ea typeface="Source Sans Pro" panose="020B0503030403020204" pitchFamily="34" charset="0"/>
-              </a:rPr>
-              <a:t>công ty.</a:t>
-            </a:r>
-          </a:p>
-          <a:p>
-            <a:pPr>
-              <a:buSzPct val="100000"/>
-              <a:buFont typeface="Wingdings" panose="05000000000000000000" pitchFamily="2" charset="2"/>
-              <a:buChar char="ü"/>
-            </a:pPr>
-            <a:r>
-              <a:rPr lang="vi-VN" sz="1400" dirty="0">
-                <a:latin typeface="Source Sans Pro" panose="020B0503030403020204" pitchFamily="34" charset="0"/>
-                <a:ea typeface="Source Sans Pro" panose="020B0503030403020204" pitchFamily="34" charset="0"/>
-              </a:rPr>
-              <a:t>Phân tích và đánh giá các yêu cầu của website.</a:t>
-            </a:r>
-          </a:p>
-          <a:p>
-            <a:pPr>
-              <a:buSzPct val="100000"/>
-              <a:buFont typeface="Wingdings" panose="05000000000000000000" pitchFamily="2" charset="2"/>
-              <a:buChar char="ü"/>
-            </a:pPr>
-            <a:r>
-              <a:rPr lang="vi-VN" sz="1400" dirty="0">
-                <a:latin typeface="Source Sans Pro" panose="020B0503030403020204" pitchFamily="34" charset="0"/>
-                <a:ea typeface="Source Sans Pro" panose="020B0503030403020204" pitchFamily="34" charset="0"/>
-              </a:rPr>
-              <a:t>Vận dụng HTML, ngôn ngữ PHP,... và MYSQL</a:t>
-            </a:r>
-            <a:r>
-              <a:rPr lang="en-US" sz="1400" dirty="0">
-                <a:latin typeface="Source Sans Pro" panose="020B0503030403020204" pitchFamily="34" charset="0"/>
-                <a:ea typeface="Source Sans Pro" panose="020B0503030403020204" pitchFamily="34" charset="0"/>
-              </a:rPr>
-              <a:t> </a:t>
-            </a:r>
-            <a:r>
-              <a:rPr lang="vi-VN" sz="1400" dirty="0">
-                <a:latin typeface="Source Sans Pro" panose="020B0503030403020204" pitchFamily="34" charset="0"/>
-                <a:ea typeface="Source Sans Pro" panose="020B0503030403020204" pitchFamily="34" charset="0"/>
-              </a:rPr>
-              <a:t>vào việc xây dựng website của</a:t>
-            </a:r>
-            <a:r>
-              <a:rPr lang="en-US" sz="1400" dirty="0">
-                <a:latin typeface="Source Sans Pro" panose="020B0503030403020204" pitchFamily="34" charset="0"/>
-                <a:ea typeface="Source Sans Pro" panose="020B0503030403020204" pitchFamily="34" charset="0"/>
-              </a:rPr>
-              <a:t> </a:t>
-            </a:r>
-            <a:r>
-              <a:rPr lang="vi-VN" sz="1400" dirty="0">
-                <a:latin typeface="Source Sans Pro" panose="020B0503030403020204" pitchFamily="34" charset="0"/>
-                <a:ea typeface="Source Sans Pro" panose="020B0503030403020204" pitchFamily="34" charset="0"/>
-              </a:rPr>
-              <a:t>mình.</a:t>
-            </a:r>
-          </a:p>
-          <a:p>
-            <a:pPr>
-              <a:buSzPct val="100000"/>
-              <a:buFont typeface="Wingdings" panose="05000000000000000000" pitchFamily="2" charset="2"/>
-              <a:buChar char="ü"/>
-            </a:pPr>
-            <a:r>
-              <a:rPr lang="vi-VN" sz="1400" dirty="0">
-                <a:latin typeface="Source Sans Pro" panose="020B0503030403020204" pitchFamily="34" charset="0"/>
-                <a:ea typeface="Source Sans Pro" panose="020B0503030403020204" pitchFamily="34" charset="0"/>
-              </a:rPr>
-              <a:t>Phần giao diện người dùng: giao diện thân thiện, cho phép người dùng xem được</a:t>
-            </a:r>
-            <a:r>
-              <a:rPr lang="en-US" sz="1400" dirty="0">
-                <a:latin typeface="Source Sans Pro" panose="020B0503030403020204" pitchFamily="34" charset="0"/>
-                <a:ea typeface="Source Sans Pro" panose="020B0503030403020204" pitchFamily="34" charset="0"/>
-              </a:rPr>
-              <a:t> </a:t>
-            </a:r>
-            <a:r>
-              <a:rPr lang="vi-VN" sz="1400" dirty="0">
-                <a:latin typeface="Source Sans Pro" panose="020B0503030403020204" pitchFamily="34" charset="0"/>
-                <a:ea typeface="Source Sans Pro" panose="020B0503030403020204" pitchFamily="34" charset="0"/>
-              </a:rPr>
-              <a:t>thông tin công ty, </a:t>
-            </a:r>
-            <a:endParaRPr lang="en-US" sz="1400" dirty="0">
-              <a:latin typeface="Source Sans Pro" panose="020B0503030403020204" pitchFamily="34" charset="0"/>
-              <a:ea typeface="Source Sans Pro" panose="020B0503030403020204" pitchFamily="34" charset="0"/>
-            </a:endParaRPr>
-          </a:p>
-          <a:p>
-            <a:pPr marL="101600" indent="0">
-              <a:buSzPct val="100000"/>
-              <a:buNone/>
-            </a:pPr>
-            <a:r>
-              <a:rPr lang="en-US" sz="1400" dirty="0">
-                <a:latin typeface="Source Sans Pro" panose="020B0503030403020204" pitchFamily="34" charset="0"/>
-                <a:ea typeface="Source Sans Pro" panose="020B0503030403020204" pitchFamily="34" charset="0"/>
-              </a:rPr>
-              <a:t>          </a:t>
-            </a:r>
-            <a:r>
-              <a:rPr lang="vi-VN" sz="1400" dirty="0">
-                <a:latin typeface="Source Sans Pro" panose="020B0503030403020204" pitchFamily="34" charset="0"/>
-                <a:ea typeface="Source Sans Pro" panose="020B0503030403020204" pitchFamily="34" charset="0"/>
-              </a:rPr>
-              <a:t>sản phẩm công ty nhanh chóng dễ dàng.</a:t>
-            </a:r>
-          </a:p>
-          <a:p>
-            <a:pPr>
-              <a:buSzPct val="100000"/>
-              <a:buFont typeface="Wingdings" panose="05000000000000000000" pitchFamily="2" charset="2"/>
-              <a:buChar char="ü"/>
-            </a:pPr>
-            <a:r>
-              <a:rPr lang="vi-VN" sz="1400" dirty="0">
-                <a:latin typeface="Source Sans Pro" panose="020B0503030403020204" pitchFamily="34" charset="0"/>
-                <a:ea typeface="Source Sans Pro" panose="020B0503030403020204" pitchFamily="34" charset="0"/>
-              </a:rPr>
-              <a:t>Phần quản trị đã xây dựng được hệ thống quản lý dữ liệu của website, giúp cho</a:t>
-            </a:r>
-            <a:r>
-              <a:rPr lang="en-US" sz="1400" dirty="0">
-                <a:latin typeface="Source Sans Pro" panose="020B0503030403020204" pitchFamily="34" charset="0"/>
-                <a:ea typeface="Source Sans Pro" panose="020B0503030403020204" pitchFamily="34" charset="0"/>
-              </a:rPr>
-              <a:t> </a:t>
-            </a:r>
-            <a:r>
-              <a:rPr lang="vi-VN" sz="1400" dirty="0">
-                <a:latin typeface="Source Sans Pro" panose="020B0503030403020204" pitchFamily="34" charset="0"/>
-                <a:ea typeface="Source Sans Pro" panose="020B0503030403020204" pitchFamily="34" charset="0"/>
-              </a:rPr>
-              <a:t>những người quản trị dễ dàng quản lý thông tin, dữ liệu, xem, thêm, xóa, cập nhật</a:t>
-            </a:r>
-            <a:r>
-              <a:rPr lang="en-US" sz="1400" dirty="0">
-                <a:latin typeface="Source Sans Pro" panose="020B0503030403020204" pitchFamily="34" charset="0"/>
-                <a:ea typeface="Source Sans Pro" panose="020B0503030403020204" pitchFamily="34" charset="0"/>
-              </a:rPr>
-              <a:t> </a:t>
-            </a:r>
-            <a:r>
-              <a:rPr lang="vi-VN" sz="1400" dirty="0">
-                <a:latin typeface="Source Sans Pro" panose="020B0503030403020204" pitchFamily="34" charset="0"/>
-                <a:ea typeface="Source Sans Pro" panose="020B0503030403020204" pitchFamily="34" charset="0"/>
-              </a:rPr>
-              <a:t>dữ liệu cho website.</a:t>
-            </a:r>
-            <a:endParaRPr lang="en-US" sz="1400" dirty="0">
-              <a:latin typeface="Source Sans Pro" panose="020B0503030403020204" pitchFamily="34" charset="0"/>
-              <a:ea typeface="Source Sans Pro" panose="020B0503030403020204" pitchFamily="34" charset="0"/>
-            </a:endParaRPr>
-          </a:p>
-          <a:p>
-            <a:pPr>
-              <a:buSzPct val="100000"/>
-              <a:buFont typeface="Wingdings" panose="05000000000000000000" pitchFamily="2" charset="2"/>
-              <a:buChar char="ü"/>
-            </a:pPr>
-            <a:endParaRPr lang="en-US" sz="1400" dirty="0">
-              <a:latin typeface="Source Sans Pro" panose="020B0503030403020204" pitchFamily="34" charset="0"/>
-              <a:ea typeface="Source Sans Pro" panose="020B0503030403020204" pitchFamily="34" charset="0"/>
-            </a:endParaRPr>
-          </a:p>
-        </p:txBody>
-      </p:sp>
-      <p:sp>
-        <p:nvSpPr>
-          <p:cNvPr id="4" name="Slide Number Placeholder 3">
-            <a:extLst>
-              <a:ext uri="{FF2B5EF4-FFF2-40B4-BE49-F238E27FC236}">
-                <a16:creationId xmlns:a16="http://schemas.microsoft.com/office/drawing/2014/main" id="{ADB9EC34-B8C5-4E32-8A44-18B5959E3AF3}"/>
-              </a:ext>
-            </a:extLst>
-          </p:cNvPr>
-          <p:cNvSpPr>
-            <a:spLocks noGrp="1"/>
-          </p:cNvSpPr>
-          <p:nvPr>
-            <p:ph type="sldNum" idx="12"/>
-          </p:nvPr>
-        </p:nvSpPr>
-        <p:spPr/>
-        <p:txBody>
-          <a:bodyPr/>
-          <a:lstStyle/>
-          <a:p>
-            <a:pPr marL="0" lvl="0" indent="0" algn="r" rtl="0">
-              <a:spcBef>
-                <a:spcPts val="0"/>
-              </a:spcBef>
-              <a:spcAft>
-                <a:spcPts val="0"/>
-              </a:spcAft>
-              <a:buNone/>
-            </a:pPr>
-            <a:fld id="{00000000-1234-1234-1234-123412341234}" type="slidenum">
-              <a:rPr lang="en" smtClean="0"/>
-              <a:t>29</a:t>
-            </a:fld>
-            <a:endParaRPr lang="en"/>
-          </a:p>
-        </p:txBody>
-      </p:sp>
-    </p:spTree>
-    <p:extLst>
-      <p:ext uri="{BB962C8B-B14F-4D97-AF65-F5344CB8AC3E}">
-        <p14:creationId xmlns:p14="http://schemas.microsoft.com/office/powerpoint/2010/main" val="1591006544"/>
       </p:ext>
     </p:extLst>
   </p:cSld>
@@ -15901,7 +15752,7 @@
             </a:pPr>
             <a:r>
               <a:rPr lang="en-US" sz="2500" dirty="0" err="1"/>
-              <a:t>Hạn</a:t>
+              <a:t>Kết</a:t>
             </a:r>
             <a:r>
               <a:rPr lang="en-US" sz="2500" dirty="0"/>
@@ -15909,7 +15760,7 @@
             </a:r>
             <a:r>
               <a:rPr lang="en-US" sz="2500" dirty="0" err="1"/>
-              <a:t>chế</a:t>
+              <a:t>quả</a:t>
             </a:r>
             <a:r>
               <a:rPr lang="en-US" sz="2500" dirty="0"/>
@@ -15917,7 +15768,7 @@
             </a:r>
             <a:r>
               <a:rPr lang="en-US" sz="2500" dirty="0" err="1"/>
-              <a:t>của</a:t>
+              <a:t>đạt</a:t>
             </a:r>
             <a:r>
               <a:rPr lang="en-US" sz="2500" dirty="0"/>
@@ -15925,15 +15776,7 @@
             </a:r>
             <a:r>
               <a:rPr lang="en-US" sz="2500" dirty="0" err="1"/>
-              <a:t>chương</a:t>
-            </a:r>
-            <a:r>
-              <a:rPr lang="en-US" sz="2500" dirty="0"/>
-              <a:t> </a:t>
-            </a:r>
-            <a:r>
-              <a:rPr lang="en-US" sz="2500" dirty="0" err="1"/>
-              <a:t>trình</a:t>
+              <a:t>được</a:t>
             </a:r>
             <a:endParaRPr lang="en-US" sz="2500" dirty="0"/>
           </a:p>
@@ -15957,141 +15800,200 @@
         </p:nvSpPr>
         <p:spPr>
           <a:xfrm>
-            <a:off x="602974" y="975360"/>
-            <a:ext cx="8070574" cy="3356609"/>
+            <a:off x="602974" y="811530"/>
+            <a:ext cx="8070574" cy="3520439"/>
           </a:xfrm>
         </p:spPr>
         <p:txBody>
           <a:bodyPr/>
           <a:lstStyle/>
           <a:p>
-            <a:pPr marL="0" marR="0" indent="0">
-              <a:lnSpc>
-                <a:spcPct val="150000"/>
-              </a:lnSpc>
-              <a:spcBef>
-                <a:spcPts val="0"/>
-              </a:spcBef>
-              <a:spcAft>
-                <a:spcPts val="800"/>
-              </a:spcAft>
-              <a:buNone/>
+            <a:pPr>
+              <a:buSzPct val="100000"/>
+              <a:buFont typeface="Wingdings" panose="05000000000000000000" pitchFamily="2" charset="2"/>
+              <a:buChar char="ü"/>
             </a:pPr>
             <a:r>
-              <a:rPr lang="nl-NL" sz="1400" dirty="0">
-                <a:solidFill>
-                  <a:srgbClr val="000000"/>
-                </a:solidFill>
-                <a:effectLst/>
+              <a:rPr lang="vi-VN" sz="1400" dirty="0">
                 <a:latin typeface="Source Sans Pro" panose="020B0503030403020204" pitchFamily="34" charset="0"/>
                 <a:ea typeface="Source Sans Pro" panose="020B0503030403020204" pitchFamily="34" charset="0"/>
-                <a:cs typeface="Times New Roman" panose="02020603050405020304" pitchFamily="18" charset="0"/>
-              </a:rPr>
-              <a:t>Do thời gian làm đề tài và trình độ năng lực bản thân còn nhiều hạn chế nên chương trình của em không tránh khỏi thiếu sót và một số công việc vẫn chưa hoàn thành được như:</a:t>
+              </a:rPr>
+              <a:t>Đã đạt được mục tiêu đề ra, hoàn thành website giới thiệu công ty và sản phẩm</a:t>
+            </a:r>
+            <a:r>
+              <a:rPr lang="en-US" sz="1400" dirty="0">
+                <a:latin typeface="Source Sans Pro" panose="020B0503030403020204" pitchFamily="34" charset="0"/>
+                <a:ea typeface="Source Sans Pro" panose="020B0503030403020204" pitchFamily="34" charset="0"/>
+              </a:rPr>
+              <a:t> </a:t>
+            </a:r>
+            <a:r>
+              <a:rPr lang="vi-VN" sz="1400" dirty="0">
+                <a:latin typeface="Source Sans Pro" panose="020B0503030403020204" pitchFamily="34" charset="0"/>
+                <a:ea typeface="Source Sans Pro" panose="020B0503030403020204" pitchFamily="34" charset="0"/>
+              </a:rPr>
+              <a:t>công ty.</a:t>
+            </a:r>
+          </a:p>
+          <a:p>
+            <a:pPr>
+              <a:buSzPct val="100000"/>
+              <a:buFont typeface="Wingdings" panose="05000000000000000000" pitchFamily="2" charset="2"/>
+              <a:buChar char="ü"/>
+            </a:pPr>
+            <a:r>
+              <a:rPr lang="vi-VN" sz="1400" dirty="0">
+                <a:latin typeface="Source Sans Pro" panose="020B0503030403020204" pitchFamily="34" charset="0"/>
+                <a:ea typeface="Source Sans Pro" panose="020B0503030403020204" pitchFamily="34" charset="0"/>
+              </a:rPr>
+              <a:t>Phân tích và đánh giá các yêu cầu của website.</a:t>
+            </a:r>
+          </a:p>
+          <a:p>
+            <a:pPr>
+              <a:buSzPct val="100000"/>
+              <a:buFont typeface="Wingdings" panose="05000000000000000000" pitchFamily="2" charset="2"/>
+              <a:buChar char="ü"/>
+            </a:pPr>
+            <a:r>
+              <a:rPr lang="vi-VN" sz="1400" dirty="0">
+                <a:latin typeface="Source Sans Pro" panose="020B0503030403020204" pitchFamily="34" charset="0"/>
+                <a:ea typeface="Source Sans Pro" panose="020B0503030403020204" pitchFamily="34" charset="0"/>
+              </a:rPr>
+              <a:t>Vận dụng HTML, ngôn ngữ PHP,... và MYSQL</a:t>
+            </a:r>
+            <a:r>
+              <a:rPr lang="en-US" sz="1400" dirty="0">
+                <a:latin typeface="Source Sans Pro" panose="020B0503030403020204" pitchFamily="34" charset="0"/>
+                <a:ea typeface="Source Sans Pro" panose="020B0503030403020204" pitchFamily="34" charset="0"/>
+              </a:rPr>
+              <a:t> </a:t>
+            </a:r>
+            <a:r>
+              <a:rPr lang="vi-VN" sz="1400" dirty="0">
+                <a:latin typeface="Source Sans Pro" panose="020B0503030403020204" pitchFamily="34" charset="0"/>
+                <a:ea typeface="Source Sans Pro" panose="020B0503030403020204" pitchFamily="34" charset="0"/>
+              </a:rPr>
+              <a:t>vào việc xây dựng website của</a:t>
+            </a:r>
+            <a:r>
+              <a:rPr lang="en-US" sz="1400" dirty="0">
+                <a:latin typeface="Source Sans Pro" panose="020B0503030403020204" pitchFamily="34" charset="0"/>
+                <a:ea typeface="Source Sans Pro" panose="020B0503030403020204" pitchFamily="34" charset="0"/>
+              </a:rPr>
+              <a:t> </a:t>
+            </a:r>
+            <a:r>
+              <a:rPr lang="vi-VN" sz="1400" dirty="0">
+                <a:latin typeface="Source Sans Pro" panose="020B0503030403020204" pitchFamily="34" charset="0"/>
+                <a:ea typeface="Source Sans Pro" panose="020B0503030403020204" pitchFamily="34" charset="0"/>
+              </a:rPr>
+              <a:t>mình.</a:t>
+            </a:r>
+          </a:p>
+          <a:p>
+            <a:pPr>
+              <a:buSzPct val="100000"/>
+              <a:buFont typeface="Wingdings" panose="05000000000000000000" pitchFamily="2" charset="2"/>
+              <a:buChar char="ü"/>
+            </a:pPr>
+            <a:r>
+              <a:rPr lang="vi-VN" sz="1400" dirty="0">
+                <a:latin typeface="Source Sans Pro" panose="020B0503030403020204" pitchFamily="34" charset="0"/>
+                <a:ea typeface="Source Sans Pro" panose="020B0503030403020204" pitchFamily="34" charset="0"/>
+              </a:rPr>
+              <a:t>Phần giao diện người dùng: giao diện thân thiện, cho phép người dùng xem được</a:t>
+            </a:r>
+            <a:r>
+              <a:rPr lang="en-US" sz="1400" dirty="0">
+                <a:latin typeface="Source Sans Pro" panose="020B0503030403020204" pitchFamily="34" charset="0"/>
+                <a:ea typeface="Source Sans Pro" panose="020B0503030403020204" pitchFamily="34" charset="0"/>
+              </a:rPr>
+              <a:t> </a:t>
+            </a:r>
+            <a:r>
+              <a:rPr lang="vi-VN" sz="1400" dirty="0">
+                <a:latin typeface="Source Sans Pro" panose="020B0503030403020204" pitchFamily="34" charset="0"/>
+                <a:ea typeface="Source Sans Pro" panose="020B0503030403020204" pitchFamily="34" charset="0"/>
+              </a:rPr>
+              <a:t>thông tin công ty, </a:t>
             </a:r>
             <a:endParaRPr lang="en-US" sz="1400" dirty="0">
-              <a:effectLst/>
               <a:latin typeface="Source Sans Pro" panose="020B0503030403020204" pitchFamily="34" charset="0"/>
               <a:ea typeface="Source Sans Pro" panose="020B0503030403020204" pitchFamily="34" charset="0"/>
-              <a:cs typeface="Times New Roman" panose="02020603050405020304" pitchFamily="18" charset="0"/>
             </a:endParaRPr>
-          </a:p>
-          <a:p>
-            <a:pPr marL="342900" marR="0" lvl="0" indent="-342900" algn="just">
-              <a:lnSpc>
-                <a:spcPct val="150000"/>
-              </a:lnSpc>
-              <a:spcBef>
-                <a:spcPts val="0"/>
-              </a:spcBef>
-              <a:spcAft>
-                <a:spcPts val="0"/>
-              </a:spcAft>
-              <a:buFont typeface="Times New Roman" panose="02020603050405020304" pitchFamily="18" charset="0"/>
-              <a:buChar char="-"/>
-            </a:pPr>
-            <a:r>
-              <a:rPr lang="nl-NL" sz="1400" dirty="0">
-                <a:solidFill>
-                  <a:srgbClr val="000000"/>
-                </a:solidFill>
-                <a:effectLst/>
-                <a:latin typeface="Source Sans Pro" panose="020B0503030403020204" pitchFamily="34" charset="0"/>
-                <a:ea typeface="Source Sans Pro" panose="020B0503030403020204" pitchFamily="34" charset="0"/>
-                <a:cs typeface="Times New Roman" panose="02020603050405020304" pitchFamily="18" charset="0"/>
-              </a:rPr>
-              <a:t>Việc biểu diễn các thông tin chưa đẹp</a:t>
-            </a:r>
-            <a:endParaRPr lang="en-US" sz="1400" dirty="0">
-              <a:effectLst/>
-              <a:latin typeface="Source Sans Pro" panose="020B0503030403020204" pitchFamily="34" charset="0"/>
-              <a:ea typeface="Source Sans Pro" panose="020B0503030403020204" pitchFamily="34" charset="0"/>
-              <a:cs typeface="Times New Roman" panose="02020603050405020304" pitchFamily="18" charset="0"/>
-            </a:endParaRPr>
-          </a:p>
-          <a:p>
-            <a:pPr marL="342900" marR="0" lvl="0" indent="-342900" algn="just">
-              <a:lnSpc>
-                <a:spcPct val="150000"/>
-              </a:lnSpc>
-              <a:spcBef>
-                <a:spcPts val="0"/>
-              </a:spcBef>
-              <a:spcAft>
-                <a:spcPts val="0"/>
-              </a:spcAft>
-              <a:buFont typeface="Times New Roman" panose="02020603050405020304" pitchFamily="18" charset="0"/>
-              <a:buChar char="-"/>
-            </a:pPr>
-            <a:r>
-              <a:rPr lang="nl-NL" sz="1400" dirty="0">
-                <a:solidFill>
-                  <a:srgbClr val="000000"/>
-                </a:solidFill>
-                <a:effectLst/>
-                <a:latin typeface="Source Sans Pro" panose="020B0503030403020204" pitchFamily="34" charset="0"/>
-                <a:ea typeface="Source Sans Pro" panose="020B0503030403020204" pitchFamily="34" charset="0"/>
-                <a:cs typeface="Times New Roman" panose="02020603050405020304" pitchFamily="18" charset="0"/>
-              </a:rPr>
-              <a:t>Giao diện còn một số chỗ chưa chuyên nghiệp.</a:t>
-            </a:r>
-            <a:endParaRPr lang="en-US" sz="1400" dirty="0">
-              <a:effectLst/>
-              <a:latin typeface="Source Sans Pro" panose="020B0503030403020204" pitchFamily="34" charset="0"/>
-              <a:ea typeface="Source Sans Pro" panose="020B0503030403020204" pitchFamily="34" charset="0"/>
-              <a:cs typeface="Times New Roman" panose="02020603050405020304" pitchFamily="18" charset="0"/>
-            </a:endParaRPr>
-          </a:p>
-          <a:p>
-            <a:pPr marL="342900" marR="0" lvl="0" indent="-342900" algn="just">
-              <a:lnSpc>
-                <a:spcPct val="150000"/>
-              </a:lnSpc>
-              <a:spcBef>
-                <a:spcPts val="0"/>
-              </a:spcBef>
-              <a:spcAft>
-                <a:spcPts val="0"/>
-              </a:spcAft>
-              <a:buFont typeface="Times New Roman" panose="02020603050405020304" pitchFamily="18" charset="0"/>
-              <a:buChar char="-"/>
-            </a:pPr>
-            <a:r>
-              <a:rPr lang="nl-NL" sz="1400" dirty="0">
-                <a:solidFill>
-                  <a:srgbClr val="000000"/>
-                </a:solidFill>
-                <a:latin typeface="Source Sans Pro" panose="020B0503030403020204" pitchFamily="34" charset="0"/>
-                <a:ea typeface="Source Sans Pro" panose="020B0503030403020204" pitchFamily="34" charset="0"/>
-                <a:cs typeface="Times New Roman" panose="02020603050405020304" pitchFamily="18" charset="0"/>
-              </a:rPr>
-              <a:t>Một số chức năng còn thiếu như tìm kiếm, thanh toán...</a:t>
-            </a:r>
           </a:p>
           <a:p>
             <a:pPr marL="101600" indent="0">
               <a:buSzPct val="100000"/>
               <a:buNone/>
+            </a:pPr>
+            <a:r>
+              <a:rPr lang="en-US" sz="1400" dirty="0">
+                <a:latin typeface="Source Sans Pro" panose="020B0503030403020204" pitchFamily="34" charset="0"/>
+                <a:ea typeface="Source Sans Pro" panose="020B0503030403020204" pitchFamily="34" charset="0"/>
+              </a:rPr>
+              <a:t>          </a:t>
+            </a:r>
+            <a:r>
+              <a:rPr lang="vi-VN" sz="1400" dirty="0">
+                <a:latin typeface="Source Sans Pro" panose="020B0503030403020204" pitchFamily="34" charset="0"/>
+                <a:ea typeface="Source Sans Pro" panose="020B0503030403020204" pitchFamily="34" charset="0"/>
+              </a:rPr>
+              <a:t>sản phẩm công ty nhanh chóng dễ dàng.</a:t>
+            </a:r>
+          </a:p>
+          <a:p>
+            <a:pPr>
+              <a:buSzPct val="100000"/>
+              <a:buFont typeface="Wingdings" panose="05000000000000000000" pitchFamily="2" charset="2"/>
+              <a:buChar char="ü"/>
+            </a:pPr>
+            <a:r>
+              <a:rPr lang="vi-VN" sz="1400" dirty="0">
+                <a:latin typeface="Source Sans Pro" panose="020B0503030403020204" pitchFamily="34" charset="0"/>
+                <a:ea typeface="Source Sans Pro" panose="020B0503030403020204" pitchFamily="34" charset="0"/>
+              </a:rPr>
+              <a:t>Phần quản trị đã xây dựng được hệ thống quản lý dữ liệu của website, giúp cho</a:t>
+            </a:r>
+            <a:r>
+              <a:rPr lang="en-US" sz="1400" dirty="0">
+                <a:latin typeface="Source Sans Pro" panose="020B0503030403020204" pitchFamily="34" charset="0"/>
+                <a:ea typeface="Source Sans Pro" panose="020B0503030403020204" pitchFamily="34" charset="0"/>
+              </a:rPr>
+              <a:t> </a:t>
+            </a:r>
+            <a:r>
+              <a:rPr lang="vi-VN" sz="1400" dirty="0">
+                <a:latin typeface="Source Sans Pro" panose="020B0503030403020204" pitchFamily="34" charset="0"/>
+                <a:ea typeface="Source Sans Pro" panose="020B0503030403020204" pitchFamily="34" charset="0"/>
+              </a:rPr>
+              <a:t>những người quản trị dễ dàng quản lý thông tin, dữ liệu, xem, thêm, xóa, cập nhật</a:t>
+            </a:r>
+            <a:r>
+              <a:rPr lang="en-US" sz="1400" dirty="0">
+                <a:latin typeface="Source Sans Pro" panose="020B0503030403020204" pitchFamily="34" charset="0"/>
+                <a:ea typeface="Source Sans Pro" panose="020B0503030403020204" pitchFamily="34" charset="0"/>
+              </a:rPr>
+              <a:t> </a:t>
+            </a:r>
+            <a:r>
+              <a:rPr lang="vi-VN" sz="1400" dirty="0">
+                <a:latin typeface="Source Sans Pro" panose="020B0503030403020204" pitchFamily="34" charset="0"/>
+                <a:ea typeface="Source Sans Pro" panose="020B0503030403020204" pitchFamily="34" charset="0"/>
+              </a:rPr>
+              <a:t>dữ liệu cho website.</a:t>
+            </a:r>
+            <a:endParaRPr lang="en-US" sz="1400" dirty="0">
+              <a:latin typeface="Source Sans Pro" panose="020B0503030403020204" pitchFamily="34" charset="0"/>
+              <a:ea typeface="Source Sans Pro" panose="020B0503030403020204" pitchFamily="34" charset="0"/>
+            </a:endParaRPr>
+          </a:p>
+          <a:p>
+            <a:pPr>
+              <a:buSzPct val="100000"/>
+              <a:buFont typeface="Wingdings" panose="05000000000000000000" pitchFamily="2" charset="2"/>
+              <a:buChar char="ü"/>
             </a:pPr>
             <a:endParaRPr lang="en-US" sz="1400" dirty="0">
               <a:latin typeface="Source Sans Pro" panose="020B0503030403020204" pitchFamily="34" charset="0"/>
@@ -16141,7 +16043,7 @@
     </p:spTree>
     <p:extLst>
       <p:ext uri="{BB962C8B-B14F-4D97-AF65-F5344CB8AC3E}">
-        <p14:creationId xmlns:p14="http://schemas.microsoft.com/office/powerpoint/2010/main" val="3825584604"/>
+        <p14:creationId xmlns:p14="http://schemas.microsoft.com/office/powerpoint/2010/main" val="1591006544"/>
       </p:ext>
     </p:extLst>
   </p:cSld>
@@ -16200,6 +16102,305 @@
             </a:pPr>
             <a:r>
               <a:rPr lang="en-US" sz="2500" dirty="0" err="1"/>
+              <a:t>Hạn</a:t>
+            </a:r>
+            <a:r>
+              <a:rPr lang="en-US" sz="2500" dirty="0"/>
+              <a:t> </a:t>
+            </a:r>
+            <a:r>
+              <a:rPr lang="en-US" sz="2500" dirty="0" err="1"/>
+              <a:t>chế</a:t>
+            </a:r>
+            <a:r>
+              <a:rPr lang="en-US" sz="2500" dirty="0"/>
+              <a:t> </a:t>
+            </a:r>
+            <a:r>
+              <a:rPr lang="en-US" sz="2500" dirty="0" err="1"/>
+              <a:t>của</a:t>
+            </a:r>
+            <a:r>
+              <a:rPr lang="en-US" sz="2500" dirty="0"/>
+              <a:t> </a:t>
+            </a:r>
+            <a:r>
+              <a:rPr lang="en-US" sz="2500" dirty="0" err="1"/>
+              <a:t>chương</a:t>
+            </a:r>
+            <a:r>
+              <a:rPr lang="en-US" sz="2500" dirty="0"/>
+              <a:t> </a:t>
+            </a:r>
+            <a:r>
+              <a:rPr lang="en-US" sz="2500" dirty="0" err="1"/>
+              <a:t>trình</a:t>
+            </a:r>
+            <a:endParaRPr lang="en-US" sz="2500" dirty="0"/>
+          </a:p>
+        </p:txBody>
+      </p:sp>
+      <p:sp>
+        <p:nvSpPr>
+          <p:cNvPr id="3" name="Text Placeholder 2">
+            <a:extLst>
+              <a:ext uri="{FF2B5EF4-FFF2-40B4-BE49-F238E27FC236}">
+                <a16:creationId xmlns:a16="http://schemas.microsoft.com/office/drawing/2014/main" id="{4B2391DA-702F-4EBD-BDDF-1F7F54CCD215}"/>
+              </a:ext>
+            </a:extLst>
+          </p:cNvPr>
+          <p:cNvSpPr>
+            <a:spLocks noGrp="1"/>
+          </p:cNvSpPr>
+          <p:nvPr>
+            <p:ph type="body" idx="1"/>
+          </p:nvPr>
+        </p:nvSpPr>
+        <p:spPr>
+          <a:xfrm>
+            <a:off x="602974" y="975360"/>
+            <a:ext cx="8070574" cy="3356609"/>
+          </a:xfrm>
+        </p:spPr>
+        <p:txBody>
+          <a:bodyPr/>
+          <a:lstStyle/>
+          <a:p>
+            <a:pPr marL="0" marR="0" indent="0">
+              <a:lnSpc>
+                <a:spcPct val="150000"/>
+              </a:lnSpc>
+              <a:spcBef>
+                <a:spcPts val="0"/>
+              </a:spcBef>
+              <a:spcAft>
+                <a:spcPts val="800"/>
+              </a:spcAft>
+              <a:buNone/>
+            </a:pPr>
+            <a:r>
+              <a:rPr lang="nl-NL" sz="1400" dirty="0">
+                <a:solidFill>
+                  <a:srgbClr val="000000"/>
+                </a:solidFill>
+                <a:effectLst/>
+                <a:latin typeface="Source Sans Pro" panose="020B0503030403020204" pitchFamily="34" charset="0"/>
+                <a:ea typeface="Source Sans Pro" panose="020B0503030403020204" pitchFamily="34" charset="0"/>
+                <a:cs typeface="Times New Roman" panose="02020603050405020304" pitchFamily="18" charset="0"/>
+              </a:rPr>
+              <a:t>Do thời gian làm đề tài và trình độ năng lực bản thân còn nhiều hạn chế nên chương trình của em không tránh khỏi thiếu sót và một số công việc vẫn chưa hoàn thành được như:</a:t>
+            </a:r>
+            <a:endParaRPr lang="en-US" sz="1400" dirty="0">
+              <a:effectLst/>
+              <a:latin typeface="Source Sans Pro" panose="020B0503030403020204" pitchFamily="34" charset="0"/>
+              <a:ea typeface="Source Sans Pro" panose="020B0503030403020204" pitchFamily="34" charset="0"/>
+              <a:cs typeface="Times New Roman" panose="02020603050405020304" pitchFamily="18" charset="0"/>
+            </a:endParaRPr>
+          </a:p>
+          <a:p>
+            <a:pPr marL="342900" marR="0" lvl="0" indent="-342900" algn="just">
+              <a:lnSpc>
+                <a:spcPct val="150000"/>
+              </a:lnSpc>
+              <a:spcBef>
+                <a:spcPts val="0"/>
+              </a:spcBef>
+              <a:spcAft>
+                <a:spcPts val="0"/>
+              </a:spcAft>
+              <a:buFont typeface="Times New Roman" panose="02020603050405020304" pitchFamily="18" charset="0"/>
+              <a:buChar char="-"/>
+            </a:pPr>
+            <a:r>
+              <a:rPr lang="nl-NL" sz="1400" dirty="0">
+                <a:solidFill>
+                  <a:srgbClr val="000000"/>
+                </a:solidFill>
+                <a:effectLst/>
+                <a:latin typeface="Source Sans Pro" panose="020B0503030403020204" pitchFamily="34" charset="0"/>
+                <a:ea typeface="Source Sans Pro" panose="020B0503030403020204" pitchFamily="34" charset="0"/>
+                <a:cs typeface="Times New Roman" panose="02020603050405020304" pitchFamily="18" charset="0"/>
+              </a:rPr>
+              <a:t>Việc biểu diễn các thông tin chưa đẹp</a:t>
+            </a:r>
+            <a:endParaRPr lang="en-US" sz="1400" dirty="0">
+              <a:effectLst/>
+              <a:latin typeface="Source Sans Pro" panose="020B0503030403020204" pitchFamily="34" charset="0"/>
+              <a:ea typeface="Source Sans Pro" panose="020B0503030403020204" pitchFamily="34" charset="0"/>
+              <a:cs typeface="Times New Roman" panose="02020603050405020304" pitchFamily="18" charset="0"/>
+            </a:endParaRPr>
+          </a:p>
+          <a:p>
+            <a:pPr marL="342900" marR="0" lvl="0" indent="-342900" algn="just">
+              <a:lnSpc>
+                <a:spcPct val="150000"/>
+              </a:lnSpc>
+              <a:spcBef>
+                <a:spcPts val="0"/>
+              </a:spcBef>
+              <a:spcAft>
+                <a:spcPts val="0"/>
+              </a:spcAft>
+              <a:buFont typeface="Times New Roman" panose="02020603050405020304" pitchFamily="18" charset="0"/>
+              <a:buChar char="-"/>
+            </a:pPr>
+            <a:r>
+              <a:rPr lang="nl-NL" sz="1400" dirty="0">
+                <a:solidFill>
+                  <a:srgbClr val="000000"/>
+                </a:solidFill>
+                <a:effectLst/>
+                <a:latin typeface="Source Sans Pro" panose="020B0503030403020204" pitchFamily="34" charset="0"/>
+                <a:ea typeface="Source Sans Pro" panose="020B0503030403020204" pitchFamily="34" charset="0"/>
+                <a:cs typeface="Times New Roman" panose="02020603050405020304" pitchFamily="18" charset="0"/>
+              </a:rPr>
+              <a:t>Giao diện còn một số chỗ chưa chuyên nghiệp.</a:t>
+            </a:r>
+            <a:endParaRPr lang="en-US" sz="1400" dirty="0">
+              <a:effectLst/>
+              <a:latin typeface="Source Sans Pro" panose="020B0503030403020204" pitchFamily="34" charset="0"/>
+              <a:ea typeface="Source Sans Pro" panose="020B0503030403020204" pitchFamily="34" charset="0"/>
+              <a:cs typeface="Times New Roman" panose="02020603050405020304" pitchFamily="18" charset="0"/>
+            </a:endParaRPr>
+          </a:p>
+          <a:p>
+            <a:pPr marL="342900" marR="0" lvl="0" indent="-342900" algn="just">
+              <a:lnSpc>
+                <a:spcPct val="150000"/>
+              </a:lnSpc>
+              <a:spcBef>
+                <a:spcPts val="0"/>
+              </a:spcBef>
+              <a:spcAft>
+                <a:spcPts val="0"/>
+              </a:spcAft>
+              <a:buFont typeface="Times New Roman" panose="02020603050405020304" pitchFamily="18" charset="0"/>
+              <a:buChar char="-"/>
+            </a:pPr>
+            <a:r>
+              <a:rPr lang="nl-NL" sz="1400" dirty="0">
+                <a:solidFill>
+                  <a:srgbClr val="000000"/>
+                </a:solidFill>
+                <a:latin typeface="Source Sans Pro" panose="020B0503030403020204" pitchFamily="34" charset="0"/>
+                <a:ea typeface="Source Sans Pro" panose="020B0503030403020204" pitchFamily="34" charset="0"/>
+                <a:cs typeface="Times New Roman" panose="02020603050405020304" pitchFamily="18" charset="0"/>
+              </a:rPr>
+              <a:t>Một số chức năng còn thiếu như tìm kiếm, thanh toán...</a:t>
+            </a:r>
+          </a:p>
+          <a:p>
+            <a:pPr marL="101600" indent="0">
+              <a:buSzPct val="100000"/>
+              <a:buNone/>
+            </a:pPr>
+            <a:endParaRPr lang="en-US" sz="1400" dirty="0">
+              <a:latin typeface="Source Sans Pro" panose="020B0503030403020204" pitchFamily="34" charset="0"/>
+              <a:ea typeface="Source Sans Pro" panose="020B0503030403020204" pitchFamily="34" charset="0"/>
+            </a:endParaRPr>
+          </a:p>
+        </p:txBody>
+      </p:sp>
+      <p:sp>
+        <p:nvSpPr>
+          <p:cNvPr id="4" name="Slide Number Placeholder 3">
+            <a:extLst>
+              <a:ext uri="{FF2B5EF4-FFF2-40B4-BE49-F238E27FC236}">
+                <a16:creationId xmlns:a16="http://schemas.microsoft.com/office/drawing/2014/main" id="{ADB9EC34-B8C5-4E32-8A44-18B5959E3AF3}"/>
+              </a:ext>
+            </a:extLst>
+          </p:cNvPr>
+          <p:cNvSpPr>
+            <a:spLocks noGrp="1"/>
+          </p:cNvSpPr>
+          <p:nvPr>
+            <p:ph type="sldNum" idx="12"/>
+          </p:nvPr>
+        </p:nvSpPr>
+        <p:spPr/>
+        <p:txBody>
+          <a:bodyPr/>
+          <a:lstStyle/>
+          <a:p>
+            <a:pPr marL="0" lvl="0" indent="0" algn="r" rtl="0">
+              <a:spcBef>
+                <a:spcPts val="0"/>
+              </a:spcBef>
+              <a:spcAft>
+                <a:spcPts val="0"/>
+              </a:spcAft>
+              <a:buNone/>
+            </a:pPr>
+            <a:fld id="{00000000-1234-1234-1234-123412341234}" type="slidenum">
+              <a:rPr lang="en" smtClean="0"/>
+              <a:t>31</a:t>
+            </a:fld>
+            <a:endParaRPr lang="en"/>
+          </a:p>
+        </p:txBody>
+      </p:sp>
+    </p:spTree>
+    <p:extLst>
+      <p:ext uri="{BB962C8B-B14F-4D97-AF65-F5344CB8AC3E}">
+        <p14:creationId xmlns:p14="http://schemas.microsoft.com/office/powerpoint/2010/main" val="3825584604"/>
+      </p:ext>
+    </p:extLst>
+  </p:cSld>
+  <p:clrMapOvr>
+    <a:masterClrMapping/>
+  </p:clrMapOvr>
+</p:sld>
+</file>
+
+<file path=ppt/slides/slide32.xml><?xml version="1.0" encoding="utf-8"?>
+<p:sld xmlns:a="http://schemas.openxmlformats.org/drawingml/2006/main" xmlns:r="http://schemas.openxmlformats.org/officeDocument/2006/relationships" xmlns:p="http://schemas.openxmlformats.org/presentationml/2006/main">
+  <p:cSld>
+    <p:spTree>
+      <p:nvGrpSpPr>
+        <p:cNvPr id="1" name=""/>
+        <p:cNvGrpSpPr/>
+        <p:nvPr/>
+      </p:nvGrpSpPr>
+      <p:grpSpPr>
+        <a:xfrm>
+          <a:off x="0" y="0"/>
+          <a:ext cx="0" cy="0"/>
+          <a:chOff x="0" y="0"/>
+          <a:chExt cx="0" cy="0"/>
+        </a:xfrm>
+      </p:grpSpPr>
+      <p:sp>
+        <p:nvSpPr>
+          <p:cNvPr id="2" name="Title 1">
+            <a:extLst>
+              <a:ext uri="{FF2B5EF4-FFF2-40B4-BE49-F238E27FC236}">
+                <a16:creationId xmlns:a16="http://schemas.microsoft.com/office/drawing/2014/main" id="{70103FA4-43AE-4E9F-8165-B24D7C44ABE8}"/>
+              </a:ext>
+            </a:extLst>
+          </p:cNvPr>
+          <p:cNvSpPr>
+            <a:spLocks noGrp="1"/>
+          </p:cNvSpPr>
+          <p:nvPr>
+            <p:ph type="title"/>
+          </p:nvPr>
+        </p:nvSpPr>
+        <p:spPr>
+          <a:xfrm>
+            <a:off x="237869" y="154065"/>
+            <a:ext cx="7832431" cy="715800"/>
+          </a:xfrm>
+        </p:spPr>
+        <p:txBody>
+          <a:bodyPr/>
+          <a:lstStyle/>
+          <a:p>
+            <a:pPr marL="342900" indent="-342900" algn="l">
+              <a:buFont typeface="Wingdings" panose="05000000000000000000" pitchFamily="2" charset="2"/>
+              <a:buChar char="q"/>
+            </a:pPr>
+            <a:r>
+              <a:rPr lang="en-US" sz="2500" dirty="0" err="1"/>
               <a:t>Hướng</a:t>
             </a:r>
             <a:r>
@@ -16954,7 +17155,7 @@
             </a:pPr>
             <a:fld id="{00000000-1234-1234-1234-123412341234}" type="slidenum">
               <a:rPr lang="en" smtClean="0"/>
-              <a:t>31</a:t>
+              <a:t>32</a:t>
             </a:fld>
             <a:endParaRPr lang="en"/>
           </a:p>
@@ -16973,7 +17174,7 @@
 </p:sld>
 </file>
 
-<file path=ppt/slides/slide32.xml><?xml version="1.0" encoding="utf-8"?>
+<file path=ppt/slides/slide33.xml><?xml version="1.0" encoding="utf-8"?>
 <p:sld xmlns:a="http://schemas.openxmlformats.org/drawingml/2006/main" xmlns:r="http://schemas.openxmlformats.org/officeDocument/2006/relationships" xmlns:p="http://schemas.openxmlformats.org/presentationml/2006/main">
   <p:cSld>
     <p:spTree>

</xml_diff>